<commit_message>
Migração de OpenShift para Firebase
</commit_message>
<xml_diff>
--- a/frontend/src-img/Logo App Clube do Livro.pptx
+++ b/frontend/src-img/Logo App Clube do Livro.pptx
@@ -104,6 +104,22 @@
       </a:defRPr>
     </a:lvl9pPr>
   </p:defaultTextStyle>
+  <p:extLst>
+    <p:ext uri="{EFAFB233-063F-42B5-8137-9DF3F51BA10A}">
+      <p15:sldGuideLst xmlns:p15="http://schemas.microsoft.com/office/powerpoint/2012/main">
+        <p15:guide id="1" orient="horz" pos="2160">
+          <p15:clr>
+            <a:srgbClr val="A4A3A4"/>
+          </p15:clr>
+        </p15:guide>
+        <p15:guide id="2" pos="2880">
+          <p15:clr>
+            <a:srgbClr val="A4A3A4"/>
+          </p15:clr>
+        </p15:guide>
+      </p15:sldGuideLst>
+    </p:ext>
+  </p:extLst>
 </p:presentation>
 </file>
 
@@ -145,10 +161,9 @@
           <a:lstStyle/>
           <a:p>
             <a:r>
-              <a:rPr lang="pt-BR" smtClean="0"/>
+              <a:rPr lang="pt-BR"/>
               <a:t>Clique para editar o título mestre</a:t>
             </a:r>
-            <a:endParaRPr lang="pt-BR"/>
           </a:p>
         </p:txBody>
       </p:sp>
@@ -264,10 +279,9 @@
           </a:lstStyle>
           <a:p>
             <a:r>
-              <a:rPr lang="pt-BR" smtClean="0"/>
+              <a:rPr lang="pt-BR"/>
               <a:t>Clique para editar o estilo do subtítulo mestre</a:t>
             </a:r>
-            <a:endParaRPr lang="pt-BR"/>
           </a:p>
         </p:txBody>
       </p:sp>
@@ -288,7 +302,7 @@
           <a:p>
             <a:fld id="{DCB65B48-EE79-402C-BE0C-D4534F321AB1}" type="datetimeFigureOut">
               <a:rPr lang="pt-BR" smtClean="0"/>
-              <a:t>08/04/2019</a:t>
+              <a:t>27/06/2019</a:t>
             </a:fld>
             <a:endParaRPr lang="pt-BR"/>
           </a:p>
@@ -382,10 +396,9 @@
           <a:lstStyle/>
           <a:p>
             <a:r>
-              <a:rPr lang="pt-BR" smtClean="0"/>
+              <a:rPr lang="pt-BR"/>
               <a:t>Clique para editar o título mestre</a:t>
             </a:r>
-            <a:endParaRPr lang="pt-BR"/>
           </a:p>
         </p:txBody>
       </p:sp>
@@ -406,38 +419,37 @@
           <a:p>
             <a:pPr lvl="0"/>
             <a:r>
-              <a:rPr lang="pt-BR" smtClean="0"/>
+              <a:rPr lang="pt-BR"/>
               <a:t>Clique para editar o texto mestre</a:t>
             </a:r>
           </a:p>
           <a:p>
             <a:pPr lvl="1"/>
             <a:r>
-              <a:rPr lang="pt-BR" smtClean="0"/>
+              <a:rPr lang="pt-BR"/>
               <a:t>Segundo nível</a:t>
             </a:r>
           </a:p>
           <a:p>
             <a:pPr lvl="2"/>
             <a:r>
-              <a:rPr lang="pt-BR" smtClean="0"/>
+              <a:rPr lang="pt-BR"/>
               <a:t>Terceiro nível</a:t>
             </a:r>
           </a:p>
           <a:p>
             <a:pPr lvl="3"/>
             <a:r>
-              <a:rPr lang="pt-BR" smtClean="0"/>
+              <a:rPr lang="pt-BR"/>
               <a:t>Quarto nível</a:t>
             </a:r>
           </a:p>
           <a:p>
             <a:pPr lvl="4"/>
             <a:r>
-              <a:rPr lang="pt-BR" smtClean="0"/>
+              <a:rPr lang="pt-BR"/>
               <a:t>Quinto nível</a:t>
             </a:r>
-            <a:endParaRPr lang="pt-BR"/>
           </a:p>
         </p:txBody>
       </p:sp>
@@ -458,7 +470,7 @@
           <a:p>
             <a:fld id="{DCB65B48-EE79-402C-BE0C-D4534F321AB1}" type="datetimeFigureOut">
               <a:rPr lang="pt-BR" smtClean="0"/>
-              <a:t>08/04/2019</a:t>
+              <a:t>27/06/2019</a:t>
             </a:fld>
             <a:endParaRPr lang="pt-BR"/>
           </a:p>
@@ -557,10 +569,9 @@
           <a:lstStyle/>
           <a:p>
             <a:r>
-              <a:rPr lang="pt-BR" smtClean="0"/>
+              <a:rPr lang="pt-BR"/>
               <a:t>Clique para editar o título mestre</a:t>
             </a:r>
-            <a:endParaRPr lang="pt-BR"/>
           </a:p>
         </p:txBody>
       </p:sp>
@@ -586,38 +597,37 @@
           <a:p>
             <a:pPr lvl="0"/>
             <a:r>
-              <a:rPr lang="pt-BR" smtClean="0"/>
+              <a:rPr lang="pt-BR"/>
               <a:t>Clique para editar o texto mestre</a:t>
             </a:r>
           </a:p>
           <a:p>
             <a:pPr lvl="1"/>
             <a:r>
-              <a:rPr lang="pt-BR" smtClean="0"/>
+              <a:rPr lang="pt-BR"/>
               <a:t>Segundo nível</a:t>
             </a:r>
           </a:p>
           <a:p>
             <a:pPr lvl="2"/>
             <a:r>
-              <a:rPr lang="pt-BR" smtClean="0"/>
+              <a:rPr lang="pt-BR"/>
               <a:t>Terceiro nível</a:t>
             </a:r>
           </a:p>
           <a:p>
             <a:pPr lvl="3"/>
             <a:r>
-              <a:rPr lang="pt-BR" smtClean="0"/>
+              <a:rPr lang="pt-BR"/>
               <a:t>Quarto nível</a:t>
             </a:r>
           </a:p>
           <a:p>
             <a:pPr lvl="4"/>
             <a:r>
-              <a:rPr lang="pt-BR" smtClean="0"/>
+              <a:rPr lang="pt-BR"/>
               <a:t>Quinto nível</a:t>
             </a:r>
-            <a:endParaRPr lang="pt-BR"/>
           </a:p>
         </p:txBody>
       </p:sp>
@@ -638,7 +648,7 @@
           <a:p>
             <a:fld id="{DCB65B48-EE79-402C-BE0C-D4534F321AB1}" type="datetimeFigureOut">
               <a:rPr lang="pt-BR" smtClean="0"/>
-              <a:t>08/04/2019</a:t>
+              <a:t>27/06/2019</a:t>
             </a:fld>
             <a:endParaRPr lang="pt-BR"/>
           </a:p>
@@ -732,10 +742,9 @@
           <a:lstStyle/>
           <a:p>
             <a:r>
-              <a:rPr lang="pt-BR" smtClean="0"/>
+              <a:rPr lang="pt-BR"/>
               <a:t>Clique para editar o título mestre</a:t>
             </a:r>
-            <a:endParaRPr lang="pt-BR"/>
           </a:p>
         </p:txBody>
       </p:sp>
@@ -756,38 +765,37 @@
           <a:p>
             <a:pPr lvl="0"/>
             <a:r>
-              <a:rPr lang="pt-BR" smtClean="0"/>
+              <a:rPr lang="pt-BR"/>
               <a:t>Clique para editar o texto mestre</a:t>
             </a:r>
           </a:p>
           <a:p>
             <a:pPr lvl="1"/>
             <a:r>
-              <a:rPr lang="pt-BR" smtClean="0"/>
+              <a:rPr lang="pt-BR"/>
               <a:t>Segundo nível</a:t>
             </a:r>
           </a:p>
           <a:p>
             <a:pPr lvl="2"/>
             <a:r>
-              <a:rPr lang="pt-BR" smtClean="0"/>
+              <a:rPr lang="pt-BR"/>
               <a:t>Terceiro nível</a:t>
             </a:r>
           </a:p>
           <a:p>
             <a:pPr lvl="3"/>
             <a:r>
-              <a:rPr lang="pt-BR" smtClean="0"/>
+              <a:rPr lang="pt-BR"/>
               <a:t>Quarto nível</a:t>
             </a:r>
           </a:p>
           <a:p>
             <a:pPr lvl="4"/>
             <a:r>
-              <a:rPr lang="pt-BR" smtClean="0"/>
+              <a:rPr lang="pt-BR"/>
               <a:t>Quinto nível</a:t>
             </a:r>
-            <a:endParaRPr lang="pt-BR"/>
           </a:p>
         </p:txBody>
       </p:sp>
@@ -808,7 +816,7 @@
           <a:p>
             <a:fld id="{DCB65B48-EE79-402C-BE0C-D4534F321AB1}" type="datetimeFigureOut">
               <a:rPr lang="pt-BR" smtClean="0"/>
-              <a:t>08/04/2019</a:t>
+              <a:t>27/06/2019</a:t>
             </a:fld>
             <a:endParaRPr lang="pt-BR"/>
           </a:p>
@@ -911,10 +919,9 @@
           </a:lstStyle>
           <a:p>
             <a:r>
-              <a:rPr lang="pt-BR" smtClean="0"/>
+              <a:rPr lang="pt-BR"/>
               <a:t>Clique para editar o título mestre</a:t>
             </a:r>
-            <a:endParaRPr lang="pt-BR"/>
           </a:p>
         </p:txBody>
       </p:sp>
@@ -1031,7 +1038,7 @@
           <a:p>
             <a:pPr lvl="0"/>
             <a:r>
-              <a:rPr lang="pt-BR" smtClean="0"/>
+              <a:rPr lang="pt-BR"/>
               <a:t>Clique para editar o texto mestre</a:t>
             </a:r>
           </a:p>
@@ -1054,7 +1061,7 @@
           <a:p>
             <a:fld id="{DCB65B48-EE79-402C-BE0C-D4534F321AB1}" type="datetimeFigureOut">
               <a:rPr lang="pt-BR" smtClean="0"/>
-              <a:t>08/04/2019</a:t>
+              <a:t>27/06/2019</a:t>
             </a:fld>
             <a:endParaRPr lang="pt-BR"/>
           </a:p>
@@ -1148,10 +1155,9 @@
           <a:lstStyle/>
           <a:p>
             <a:r>
-              <a:rPr lang="pt-BR" smtClean="0"/>
+              <a:rPr lang="pt-BR"/>
               <a:t>Clique para editar o título mestre</a:t>
             </a:r>
-            <a:endParaRPr lang="pt-BR"/>
           </a:p>
         </p:txBody>
       </p:sp>
@@ -1205,38 +1211,37 @@
           <a:p>
             <a:pPr lvl="0"/>
             <a:r>
-              <a:rPr lang="pt-BR" smtClean="0"/>
+              <a:rPr lang="pt-BR"/>
               <a:t>Clique para editar o texto mestre</a:t>
             </a:r>
           </a:p>
           <a:p>
             <a:pPr lvl="1"/>
             <a:r>
-              <a:rPr lang="pt-BR" smtClean="0"/>
+              <a:rPr lang="pt-BR"/>
               <a:t>Segundo nível</a:t>
             </a:r>
           </a:p>
           <a:p>
             <a:pPr lvl="2"/>
             <a:r>
-              <a:rPr lang="pt-BR" smtClean="0"/>
+              <a:rPr lang="pt-BR"/>
               <a:t>Terceiro nível</a:t>
             </a:r>
           </a:p>
           <a:p>
             <a:pPr lvl="3"/>
             <a:r>
-              <a:rPr lang="pt-BR" smtClean="0"/>
+              <a:rPr lang="pt-BR"/>
               <a:t>Quarto nível</a:t>
             </a:r>
           </a:p>
           <a:p>
             <a:pPr lvl="4"/>
             <a:r>
-              <a:rPr lang="pt-BR" smtClean="0"/>
+              <a:rPr lang="pt-BR"/>
               <a:t>Quinto nível</a:t>
             </a:r>
-            <a:endParaRPr lang="pt-BR"/>
           </a:p>
         </p:txBody>
       </p:sp>
@@ -1290,38 +1295,37 @@
           <a:p>
             <a:pPr lvl="0"/>
             <a:r>
-              <a:rPr lang="pt-BR" smtClean="0"/>
+              <a:rPr lang="pt-BR"/>
               <a:t>Clique para editar o texto mestre</a:t>
             </a:r>
           </a:p>
           <a:p>
             <a:pPr lvl="1"/>
             <a:r>
-              <a:rPr lang="pt-BR" smtClean="0"/>
+              <a:rPr lang="pt-BR"/>
               <a:t>Segundo nível</a:t>
             </a:r>
           </a:p>
           <a:p>
             <a:pPr lvl="2"/>
             <a:r>
-              <a:rPr lang="pt-BR" smtClean="0"/>
+              <a:rPr lang="pt-BR"/>
               <a:t>Terceiro nível</a:t>
             </a:r>
           </a:p>
           <a:p>
             <a:pPr lvl="3"/>
             <a:r>
-              <a:rPr lang="pt-BR" smtClean="0"/>
+              <a:rPr lang="pt-BR"/>
               <a:t>Quarto nível</a:t>
             </a:r>
           </a:p>
           <a:p>
             <a:pPr lvl="4"/>
             <a:r>
-              <a:rPr lang="pt-BR" smtClean="0"/>
+              <a:rPr lang="pt-BR"/>
               <a:t>Quinto nível</a:t>
             </a:r>
-            <a:endParaRPr lang="pt-BR"/>
           </a:p>
         </p:txBody>
       </p:sp>
@@ -1342,7 +1346,7 @@
           <a:p>
             <a:fld id="{DCB65B48-EE79-402C-BE0C-D4534F321AB1}" type="datetimeFigureOut">
               <a:rPr lang="pt-BR" smtClean="0"/>
-              <a:t>08/04/2019</a:t>
+              <a:t>27/06/2019</a:t>
             </a:fld>
             <a:endParaRPr lang="pt-BR"/>
           </a:p>
@@ -1440,10 +1444,9 @@
           </a:lstStyle>
           <a:p>
             <a:r>
-              <a:rPr lang="pt-BR" smtClean="0"/>
+              <a:rPr lang="pt-BR"/>
               <a:t>Clique para editar o título mestre</a:t>
             </a:r>
-            <a:endParaRPr lang="pt-BR"/>
           </a:p>
         </p:txBody>
       </p:sp>
@@ -1506,7 +1509,7 @@
           <a:p>
             <a:pPr lvl="0"/>
             <a:r>
-              <a:rPr lang="pt-BR" smtClean="0"/>
+              <a:rPr lang="pt-BR"/>
               <a:t>Clique para editar o texto mestre</a:t>
             </a:r>
           </a:p>
@@ -1562,38 +1565,37 @@
           <a:p>
             <a:pPr lvl="0"/>
             <a:r>
-              <a:rPr lang="pt-BR" smtClean="0"/>
+              <a:rPr lang="pt-BR"/>
               <a:t>Clique para editar o texto mestre</a:t>
             </a:r>
           </a:p>
           <a:p>
             <a:pPr lvl="1"/>
             <a:r>
-              <a:rPr lang="pt-BR" smtClean="0"/>
+              <a:rPr lang="pt-BR"/>
               <a:t>Segundo nível</a:t>
             </a:r>
           </a:p>
           <a:p>
             <a:pPr lvl="2"/>
             <a:r>
-              <a:rPr lang="pt-BR" smtClean="0"/>
+              <a:rPr lang="pt-BR"/>
               <a:t>Terceiro nível</a:t>
             </a:r>
           </a:p>
           <a:p>
             <a:pPr lvl="3"/>
             <a:r>
-              <a:rPr lang="pt-BR" smtClean="0"/>
+              <a:rPr lang="pt-BR"/>
               <a:t>Quarto nível</a:t>
             </a:r>
           </a:p>
           <a:p>
             <a:pPr lvl="4"/>
             <a:r>
-              <a:rPr lang="pt-BR" smtClean="0"/>
+              <a:rPr lang="pt-BR"/>
               <a:t>Quinto nível</a:t>
             </a:r>
-            <a:endParaRPr lang="pt-BR"/>
           </a:p>
         </p:txBody>
       </p:sp>
@@ -1656,7 +1658,7 @@
           <a:p>
             <a:pPr lvl="0"/>
             <a:r>
-              <a:rPr lang="pt-BR" smtClean="0"/>
+              <a:rPr lang="pt-BR"/>
               <a:t>Clique para editar o texto mestre</a:t>
             </a:r>
           </a:p>
@@ -1712,38 +1714,37 @@
           <a:p>
             <a:pPr lvl="0"/>
             <a:r>
-              <a:rPr lang="pt-BR" smtClean="0"/>
+              <a:rPr lang="pt-BR"/>
               <a:t>Clique para editar o texto mestre</a:t>
             </a:r>
           </a:p>
           <a:p>
             <a:pPr lvl="1"/>
             <a:r>
-              <a:rPr lang="pt-BR" smtClean="0"/>
+              <a:rPr lang="pt-BR"/>
               <a:t>Segundo nível</a:t>
             </a:r>
           </a:p>
           <a:p>
             <a:pPr lvl="2"/>
             <a:r>
-              <a:rPr lang="pt-BR" smtClean="0"/>
+              <a:rPr lang="pt-BR"/>
               <a:t>Terceiro nível</a:t>
             </a:r>
           </a:p>
           <a:p>
             <a:pPr lvl="3"/>
             <a:r>
-              <a:rPr lang="pt-BR" smtClean="0"/>
+              <a:rPr lang="pt-BR"/>
               <a:t>Quarto nível</a:t>
             </a:r>
           </a:p>
           <a:p>
             <a:pPr lvl="4"/>
             <a:r>
-              <a:rPr lang="pt-BR" smtClean="0"/>
+              <a:rPr lang="pt-BR"/>
               <a:t>Quinto nível</a:t>
             </a:r>
-            <a:endParaRPr lang="pt-BR"/>
           </a:p>
         </p:txBody>
       </p:sp>
@@ -1764,7 +1765,7 @@
           <a:p>
             <a:fld id="{DCB65B48-EE79-402C-BE0C-D4534F321AB1}" type="datetimeFigureOut">
               <a:rPr lang="pt-BR" smtClean="0"/>
-              <a:t>08/04/2019</a:t>
+              <a:t>27/06/2019</a:t>
             </a:fld>
             <a:endParaRPr lang="pt-BR"/>
           </a:p>
@@ -1858,10 +1859,9 @@
           <a:lstStyle/>
           <a:p>
             <a:r>
-              <a:rPr lang="pt-BR" smtClean="0"/>
+              <a:rPr lang="pt-BR"/>
               <a:t>Clique para editar o título mestre</a:t>
             </a:r>
-            <a:endParaRPr lang="pt-BR"/>
           </a:p>
         </p:txBody>
       </p:sp>
@@ -1882,7 +1882,7 @@
           <a:p>
             <a:fld id="{DCB65B48-EE79-402C-BE0C-D4534F321AB1}" type="datetimeFigureOut">
               <a:rPr lang="pt-BR" smtClean="0"/>
-              <a:t>08/04/2019</a:t>
+              <a:t>27/06/2019</a:t>
             </a:fld>
             <a:endParaRPr lang="pt-BR"/>
           </a:p>
@@ -1977,7 +1977,7 @@
           <a:p>
             <a:fld id="{DCB65B48-EE79-402C-BE0C-D4534F321AB1}" type="datetimeFigureOut">
               <a:rPr lang="pt-BR" smtClean="0"/>
-              <a:t>08/04/2019</a:t>
+              <a:t>27/06/2019</a:t>
             </a:fld>
             <a:endParaRPr lang="pt-BR"/>
           </a:p>
@@ -2080,10 +2080,9 @@
           </a:lstStyle>
           <a:p>
             <a:r>
-              <a:rPr lang="pt-BR" smtClean="0"/>
+              <a:rPr lang="pt-BR"/>
               <a:t>Clique para editar o título mestre</a:t>
             </a:r>
-            <a:endParaRPr lang="pt-BR"/>
           </a:p>
         </p:txBody>
       </p:sp>
@@ -2137,38 +2136,37 @@
           <a:p>
             <a:pPr lvl="0"/>
             <a:r>
-              <a:rPr lang="pt-BR" smtClean="0"/>
+              <a:rPr lang="pt-BR"/>
               <a:t>Clique para editar o texto mestre</a:t>
             </a:r>
           </a:p>
           <a:p>
             <a:pPr lvl="1"/>
             <a:r>
-              <a:rPr lang="pt-BR" smtClean="0"/>
+              <a:rPr lang="pt-BR"/>
               <a:t>Segundo nível</a:t>
             </a:r>
           </a:p>
           <a:p>
             <a:pPr lvl="2"/>
             <a:r>
-              <a:rPr lang="pt-BR" smtClean="0"/>
+              <a:rPr lang="pt-BR"/>
               <a:t>Terceiro nível</a:t>
             </a:r>
           </a:p>
           <a:p>
             <a:pPr lvl="3"/>
             <a:r>
-              <a:rPr lang="pt-BR" smtClean="0"/>
+              <a:rPr lang="pt-BR"/>
               <a:t>Quarto nível</a:t>
             </a:r>
           </a:p>
           <a:p>
             <a:pPr lvl="4"/>
             <a:r>
-              <a:rPr lang="pt-BR" smtClean="0"/>
+              <a:rPr lang="pt-BR"/>
               <a:t>Quinto nível</a:t>
             </a:r>
-            <a:endParaRPr lang="pt-BR"/>
           </a:p>
         </p:txBody>
       </p:sp>
@@ -2231,7 +2229,7 @@
           <a:p>
             <a:pPr lvl="0"/>
             <a:r>
-              <a:rPr lang="pt-BR" smtClean="0"/>
+              <a:rPr lang="pt-BR"/>
               <a:t>Clique para editar o texto mestre</a:t>
             </a:r>
           </a:p>
@@ -2254,7 +2252,7 @@
           <a:p>
             <a:fld id="{DCB65B48-EE79-402C-BE0C-D4534F321AB1}" type="datetimeFigureOut">
               <a:rPr lang="pt-BR" smtClean="0"/>
-              <a:t>08/04/2019</a:t>
+              <a:t>27/06/2019</a:t>
             </a:fld>
             <a:endParaRPr lang="pt-BR"/>
           </a:p>
@@ -2357,10 +2355,9 @@
           </a:lstStyle>
           <a:p>
             <a:r>
-              <a:rPr lang="pt-BR" smtClean="0"/>
+              <a:rPr lang="pt-BR"/>
               <a:t>Clique para editar o título mestre</a:t>
             </a:r>
-            <a:endParaRPr lang="pt-BR"/>
           </a:p>
         </p:txBody>
       </p:sp>
@@ -2484,7 +2481,7 @@
           <a:p>
             <a:pPr lvl="0"/>
             <a:r>
-              <a:rPr lang="pt-BR" smtClean="0"/>
+              <a:rPr lang="pt-BR"/>
               <a:t>Clique para editar o texto mestre</a:t>
             </a:r>
           </a:p>
@@ -2507,7 +2504,7 @@
           <a:p>
             <a:fld id="{DCB65B48-EE79-402C-BE0C-D4534F321AB1}" type="datetimeFigureOut">
               <a:rPr lang="pt-BR" smtClean="0"/>
-              <a:t>08/04/2019</a:t>
+              <a:t>27/06/2019</a:t>
             </a:fld>
             <a:endParaRPr lang="pt-BR"/>
           </a:p>
@@ -2616,10 +2613,9 @@
           <a:lstStyle/>
           <a:p>
             <a:r>
-              <a:rPr lang="pt-BR" smtClean="0"/>
+              <a:rPr lang="pt-BR"/>
               <a:t>Clique para editar o título mestre</a:t>
             </a:r>
-            <a:endParaRPr lang="pt-BR"/>
           </a:p>
         </p:txBody>
       </p:sp>
@@ -2650,38 +2646,37 @@
           <a:p>
             <a:pPr lvl="0"/>
             <a:r>
-              <a:rPr lang="pt-BR" smtClean="0"/>
+              <a:rPr lang="pt-BR"/>
               <a:t>Clique para editar o texto mestre</a:t>
             </a:r>
           </a:p>
           <a:p>
             <a:pPr lvl="1"/>
             <a:r>
-              <a:rPr lang="pt-BR" smtClean="0"/>
+              <a:rPr lang="pt-BR"/>
               <a:t>Segundo nível</a:t>
             </a:r>
           </a:p>
           <a:p>
             <a:pPr lvl="2"/>
             <a:r>
-              <a:rPr lang="pt-BR" smtClean="0"/>
+              <a:rPr lang="pt-BR"/>
               <a:t>Terceiro nível</a:t>
             </a:r>
           </a:p>
           <a:p>
             <a:pPr lvl="3"/>
             <a:r>
-              <a:rPr lang="pt-BR" smtClean="0"/>
+              <a:rPr lang="pt-BR"/>
               <a:t>Quarto nível</a:t>
             </a:r>
           </a:p>
           <a:p>
             <a:pPr lvl="4"/>
             <a:r>
-              <a:rPr lang="pt-BR" smtClean="0"/>
+              <a:rPr lang="pt-BR"/>
               <a:t>Quinto nível</a:t>
             </a:r>
-            <a:endParaRPr lang="pt-BR"/>
           </a:p>
         </p:txBody>
       </p:sp>
@@ -2720,7 +2715,7 @@
           <a:p>
             <a:fld id="{DCB65B48-EE79-402C-BE0C-D4534F321AB1}" type="datetimeFigureOut">
               <a:rPr lang="pt-BR" smtClean="0"/>
-              <a:t>08/04/2019</a:t>
+              <a:t>27/06/2019</a:t>
             </a:fld>
             <a:endParaRPr lang="pt-BR"/>
           </a:p>
@@ -3183,8 +3178,8 @@
         </p:nvSpPr>
         <p:spPr>
           <a:xfrm>
-            <a:off x="1569922" y="2151726"/>
-            <a:ext cx="6112058" cy="2554545"/>
+            <a:off x="804233" y="-99392"/>
+            <a:ext cx="7643439" cy="7017306"/>
           </a:xfrm>
           <a:prstGeom prst="rect">
             <a:avLst/>
@@ -3199,45 +3194,41 @@
           <a:p>
             <a:pPr algn="ctr"/>
             <a:r>
-              <a:rPr lang="pt-BR" sz="8000" dirty="0" err="1" smtClean="0">
+              <a:rPr lang="pt-BR" sz="15000" b="1" dirty="0">
                 <a:solidFill>
                   <a:schemeClr val="tx2">
                     <a:lumMod val="75000"/>
                   </a:schemeClr>
                 </a:solidFill>
               </a:rPr>
-              <a:t>App</a:t>
-            </a:r>
-            <a:r>
-              <a:rPr lang="pt-BR" sz="8000" dirty="0" smtClean="0">
+              <a:t>App </a:t>
+            </a:r>
+          </a:p>
+          <a:p>
+            <a:pPr algn="ctr"/>
+            <a:r>
+              <a:rPr lang="pt-BR" sz="15000" b="1" dirty="0">
                 <a:solidFill>
                   <a:schemeClr val="tx2">
                     <a:lumMod val="75000"/>
                   </a:schemeClr>
                 </a:solidFill>
               </a:rPr>
-              <a:t> </a:t>
+              <a:t>Clube do </a:t>
             </a:r>
           </a:p>
           <a:p>
             <a:pPr algn="ctr"/>
             <a:r>
-              <a:rPr lang="pt-BR" sz="8000" dirty="0" smtClean="0">
+              <a:rPr lang="pt-BR" sz="15000" b="1" dirty="0">
                 <a:solidFill>
                   <a:schemeClr val="tx2">
                     <a:lumMod val="75000"/>
                   </a:schemeClr>
                 </a:solidFill>
               </a:rPr>
-              <a:t>Clube do Livro</a:t>
-            </a:r>
-            <a:endParaRPr lang="pt-BR" sz="8000" dirty="0">
-              <a:solidFill>
-                <a:schemeClr val="tx2">
-                  <a:lumMod val="75000"/>
-                </a:schemeClr>
-              </a:solidFill>
-            </a:endParaRPr>
+              <a:t>Livro</a:t>
+            </a:r>
           </a:p>
         </p:txBody>
       </p:sp>

</xml_diff>